<commit_message>
Changed axis of phenols graph
</commit_message>
<xml_diff>
--- a/Phenols/Manuscript Fig For Phenols.pptx
+++ b/Phenols/Manuscript Fig For Phenols.pptx
@@ -254,7 +254,7 @@
           <a:p>
             <a:fld id="{5CB0509E-27EF-452A-A039-7040FC9CE352}" type="datetimeFigureOut">
               <a:rPr lang="en-SG" smtClean="0"/>
-              <a:t>3/10/2024</a:t>
+              <a:t>15/10/2024</a:t>
             </a:fld>
             <a:endParaRPr lang="en-SG"/>
           </a:p>
@@ -424,7 +424,7 @@
           <a:p>
             <a:fld id="{5CB0509E-27EF-452A-A039-7040FC9CE352}" type="datetimeFigureOut">
               <a:rPr lang="en-SG" smtClean="0"/>
-              <a:t>3/10/2024</a:t>
+              <a:t>15/10/2024</a:t>
             </a:fld>
             <a:endParaRPr lang="en-SG"/>
           </a:p>
@@ -604,7 +604,7 @@
           <a:p>
             <a:fld id="{5CB0509E-27EF-452A-A039-7040FC9CE352}" type="datetimeFigureOut">
               <a:rPr lang="en-SG" smtClean="0"/>
-              <a:t>3/10/2024</a:t>
+              <a:t>15/10/2024</a:t>
             </a:fld>
             <a:endParaRPr lang="en-SG"/>
           </a:p>
@@ -774,7 +774,7 @@
           <a:p>
             <a:fld id="{5CB0509E-27EF-452A-A039-7040FC9CE352}" type="datetimeFigureOut">
               <a:rPr lang="en-SG" smtClean="0"/>
-              <a:t>3/10/2024</a:t>
+              <a:t>15/10/2024</a:t>
             </a:fld>
             <a:endParaRPr lang="en-SG"/>
           </a:p>
@@ -1020,7 +1020,7 @@
           <a:p>
             <a:fld id="{5CB0509E-27EF-452A-A039-7040FC9CE352}" type="datetimeFigureOut">
               <a:rPr lang="en-SG" smtClean="0"/>
-              <a:t>3/10/2024</a:t>
+              <a:t>15/10/2024</a:t>
             </a:fld>
             <a:endParaRPr lang="en-SG"/>
           </a:p>
@@ -1252,7 +1252,7 @@
           <a:p>
             <a:fld id="{5CB0509E-27EF-452A-A039-7040FC9CE352}" type="datetimeFigureOut">
               <a:rPr lang="en-SG" smtClean="0"/>
-              <a:t>3/10/2024</a:t>
+              <a:t>15/10/2024</a:t>
             </a:fld>
             <a:endParaRPr lang="en-SG"/>
           </a:p>
@@ -1619,7 +1619,7 @@
           <a:p>
             <a:fld id="{5CB0509E-27EF-452A-A039-7040FC9CE352}" type="datetimeFigureOut">
               <a:rPr lang="en-SG" smtClean="0"/>
-              <a:t>3/10/2024</a:t>
+              <a:t>15/10/2024</a:t>
             </a:fld>
             <a:endParaRPr lang="en-SG"/>
           </a:p>
@@ -1737,7 +1737,7 @@
           <a:p>
             <a:fld id="{5CB0509E-27EF-452A-A039-7040FC9CE352}" type="datetimeFigureOut">
               <a:rPr lang="en-SG" smtClean="0"/>
-              <a:t>3/10/2024</a:t>
+              <a:t>15/10/2024</a:t>
             </a:fld>
             <a:endParaRPr lang="en-SG"/>
           </a:p>
@@ -1832,7 +1832,7 @@
           <a:p>
             <a:fld id="{5CB0509E-27EF-452A-A039-7040FC9CE352}" type="datetimeFigureOut">
               <a:rPr lang="en-SG" smtClean="0"/>
-              <a:t>3/10/2024</a:t>
+              <a:t>15/10/2024</a:t>
             </a:fld>
             <a:endParaRPr lang="en-SG"/>
           </a:p>
@@ -2109,7 +2109,7 @@
           <a:p>
             <a:fld id="{5CB0509E-27EF-452A-A039-7040FC9CE352}" type="datetimeFigureOut">
               <a:rPr lang="en-SG" smtClean="0"/>
-              <a:t>3/10/2024</a:t>
+              <a:t>15/10/2024</a:t>
             </a:fld>
             <a:endParaRPr lang="en-SG"/>
           </a:p>
@@ -2362,7 +2362,7 @@
           <a:p>
             <a:fld id="{5CB0509E-27EF-452A-A039-7040FC9CE352}" type="datetimeFigureOut">
               <a:rPr lang="en-SG" smtClean="0"/>
-              <a:t>3/10/2024</a:t>
+              <a:t>15/10/2024</a:t>
             </a:fld>
             <a:endParaRPr lang="en-SG"/>
           </a:p>
@@ -2575,7 +2575,7 @@
           <a:p>
             <a:fld id="{5CB0509E-27EF-452A-A039-7040FC9CE352}" type="datetimeFigureOut">
               <a:rPr lang="en-SG" smtClean="0"/>
-              <a:t>3/10/2024</a:t>
+              <a:t>15/10/2024</a:t>
             </a:fld>
             <a:endParaRPr lang="en-SG"/>
           </a:p>
@@ -2982,7 +2982,7 @@
       </p:grpSpPr>
       <p:pic>
         <p:nvPicPr>
-          <p:cNvPr id="3" name="Picture 2"/>
+          <p:cNvPr id="2" name="Picture 1"/>
           <p:cNvPicPr>
             <a:picLocks noChangeAspect="1"/>
           </p:cNvPicPr>
@@ -3012,7 +3012,7 @@
       </p:pic>
       <p:pic>
         <p:nvPicPr>
-          <p:cNvPr id="4" name="Picture 3"/>
+          <p:cNvPr id="5" name="Picture 4"/>
           <p:cNvPicPr>
             <a:picLocks noChangeAspect="1"/>
           </p:cNvPicPr>
@@ -3026,13 +3026,13 @@
               </a:ext>
             </a:extLst>
           </a:blip>
-          <a:srcRect r="28245"/>
+          <a:srcRect r="28017"/>
           <a:stretch/>
         </p:blipFill>
         <p:spPr>
           <a:xfrm>
-            <a:off x="6077782" y="328506"/>
-            <a:ext cx="5949364" cy="6217920"/>
+            <a:off x="6096000" y="320040"/>
+            <a:ext cx="5968271" cy="6217920"/>
           </a:xfrm>
           <a:prstGeom prst="rect">
             <a:avLst/>

</xml_diff>